<commit_message>
entrega do ppt finalizado
</commit_message>
<xml_diff>
--- a/Entrega02.pptx
+++ b/Entrega02.pptx
@@ -14,9 +14,8 @@
     <p:sldId id="262" r:id="rId8"/>
     <p:sldId id="263" r:id="rId9"/>
     <p:sldId id="264" r:id="rId10"/>
-    <p:sldId id="265" r:id="rId11"/>
-    <p:sldId id="266" r:id="rId12"/>
-    <p:sldId id="267" r:id="rId13"/>
+    <p:sldId id="266" r:id="rId11"/>
+    <p:sldId id="267" r:id="rId12"/>
   </p:sldIdLst>
   <p:sldSz cx="12192000" cy="6858000"/>
   <p:notesSz cx="6858000" cy="9144000"/>
@@ -8336,7 +8335,7 @@
           <a:p>
             <a:fld id="{DDD670B3-E2EA-4637-9A35-A3F69C814A4D}" type="datetimeFigureOut">
               <a:rPr lang="pt-BR" smtClean="0"/>
-              <a:t>18/08/2017</a:t>
+              <a:t>22/08/2017</a:t>
             </a:fld>
             <a:endParaRPr lang="pt-BR"/>
           </a:p>
@@ -8550,7 +8549,7 @@
           <a:p>
             <a:fld id="{DDD670B3-E2EA-4637-9A35-A3F69C814A4D}" type="datetimeFigureOut">
               <a:rPr lang="pt-BR" smtClean="0"/>
-              <a:t>18/08/2017</a:t>
+              <a:t>22/08/2017</a:t>
             </a:fld>
             <a:endParaRPr lang="pt-BR"/>
           </a:p>
@@ -8774,7 +8773,7 @@
           <a:p>
             <a:fld id="{DDD670B3-E2EA-4637-9A35-A3F69C814A4D}" type="datetimeFigureOut">
               <a:rPr lang="pt-BR" smtClean="0"/>
-              <a:t>18/08/2017</a:t>
+              <a:t>22/08/2017</a:t>
             </a:fld>
             <a:endParaRPr lang="pt-BR"/>
           </a:p>
@@ -8988,7 +8987,7 @@
           <a:p>
             <a:fld id="{DDD670B3-E2EA-4637-9A35-A3F69C814A4D}" type="datetimeFigureOut">
               <a:rPr lang="pt-BR" smtClean="0"/>
-              <a:t>18/08/2017</a:t>
+              <a:t>22/08/2017</a:t>
             </a:fld>
             <a:endParaRPr lang="pt-BR"/>
           </a:p>
@@ -9278,7 +9277,7 @@
           <a:p>
             <a:fld id="{DDD670B3-E2EA-4637-9A35-A3F69C814A4D}" type="datetimeFigureOut">
               <a:rPr lang="pt-BR" smtClean="0"/>
-              <a:t>18/08/2017</a:t>
+              <a:t>22/08/2017</a:t>
             </a:fld>
             <a:endParaRPr lang="pt-BR"/>
           </a:p>
@@ -9554,7 +9553,7 @@
           <a:p>
             <a:fld id="{DDD670B3-E2EA-4637-9A35-A3F69C814A4D}" type="datetimeFigureOut">
               <a:rPr lang="pt-BR" smtClean="0"/>
-              <a:t>18/08/2017</a:t>
+              <a:t>22/08/2017</a:t>
             </a:fld>
             <a:endParaRPr lang="pt-BR"/>
           </a:p>
@@ -9965,7 +9964,7 @@
           <a:p>
             <a:fld id="{DDD670B3-E2EA-4637-9A35-A3F69C814A4D}" type="datetimeFigureOut">
               <a:rPr lang="pt-BR" smtClean="0"/>
-              <a:t>18/08/2017</a:t>
+              <a:t>22/08/2017</a:t>
             </a:fld>
             <a:endParaRPr lang="pt-BR"/>
           </a:p>
@@ -10127,7 +10126,7 @@
           <a:p>
             <a:fld id="{DDD670B3-E2EA-4637-9A35-A3F69C814A4D}" type="datetimeFigureOut">
               <a:rPr lang="pt-BR" smtClean="0"/>
-              <a:t>18/08/2017</a:t>
+              <a:t>22/08/2017</a:t>
             </a:fld>
             <a:endParaRPr lang="pt-BR"/>
           </a:p>
@@ -10266,7 +10265,7 @@
           <a:p>
             <a:fld id="{DDD670B3-E2EA-4637-9A35-A3F69C814A4D}" type="datetimeFigureOut">
               <a:rPr lang="pt-BR" smtClean="0"/>
-              <a:t>18/08/2017</a:t>
+              <a:t>22/08/2017</a:t>
             </a:fld>
             <a:endParaRPr lang="pt-BR"/>
           </a:p>
@@ -10587,7 +10586,7 @@
           <a:p>
             <a:fld id="{DDD670B3-E2EA-4637-9A35-A3F69C814A4D}" type="datetimeFigureOut">
               <a:rPr lang="pt-BR" smtClean="0"/>
-              <a:t>18/08/2017</a:t>
+              <a:t>22/08/2017</a:t>
             </a:fld>
             <a:endParaRPr lang="pt-BR"/>
           </a:p>
@@ -10888,7 +10887,7 @@
           <a:p>
             <a:fld id="{DDD670B3-E2EA-4637-9A35-A3F69C814A4D}" type="datetimeFigureOut">
               <a:rPr lang="pt-BR" smtClean="0"/>
-              <a:t>18/08/2017</a:t>
+              <a:t>22/08/2017</a:t>
             </a:fld>
             <a:endParaRPr lang="pt-BR"/>
           </a:p>
@@ -11145,7 +11144,7 @@
           <a:p>
             <a:fld id="{DDD670B3-E2EA-4637-9A35-A3F69C814A4D}" type="datetimeFigureOut">
               <a:rPr lang="pt-BR" smtClean="0"/>
-              <a:t>18/08/2017</a:t>
+              <a:t>22/08/2017</a:t>
             </a:fld>
             <a:endParaRPr lang="pt-BR"/>
           </a:p>
@@ -11648,14 +11647,14 @@
           <a:p>
             <a:r>
               <a:rPr lang="pt-BR" sz="2800" dirty="0"/>
-              <a:t>3ª atividade</a:t>
+              <a:t>4ª atividade</a:t>
             </a:r>
           </a:p>
         </p:txBody>
       </p:sp>
       <p:sp>
         <p:nvSpPr>
-          <p:cNvPr id="4" name="Espaço Reservado para Conteúdo 3"/>
+          <p:cNvPr id="3" name="Espaço Reservado para Conteúdo 2"/>
           <p:cNvSpPr>
             <a:spLocks noGrp="1"/>
           </p:cNvSpPr>
@@ -11663,12 +11662,56 @@
             <p:ph idx="1"/>
           </p:nvPr>
         </p:nvSpPr>
-        <p:spPr/>
+        <p:spPr>
+          <a:xfrm>
+            <a:off x="2184400" y="357312"/>
+            <a:ext cx="9855200" cy="4351338"/>
+          </a:xfrm>
+        </p:spPr>
         <p:txBody>
-          <a:bodyPr/>
+          <a:bodyPr>
+            <a:normAutofit/>
+          </a:bodyPr>
           <a:lstStyle/>
           <a:p>
-            <a:endParaRPr lang="pt-BR"/>
+            <a:pPr marL="0" indent="0">
+              <a:buNone/>
+            </a:pPr>
+            <a:r>
+              <a:rPr lang="pt-BR" sz="1800" dirty="0"/>
+              <a:t>Para ser completo, o portfólio deve ter uma página inicial e uma página sobre o aluno.</a:t>
+            </a:r>
+            <a:endParaRPr lang="pt-BR" sz="1200" dirty="0"/>
+          </a:p>
+        </p:txBody>
+      </p:sp>
+      <p:sp>
+        <p:nvSpPr>
+          <p:cNvPr id="6" name="CaixaDeTexto 5"/>
+          <p:cNvSpPr txBox="1"/>
+          <p:nvPr/>
+        </p:nvSpPr>
+        <p:spPr>
+          <a:xfrm>
+            <a:off x="279400" y="908111"/>
+            <a:ext cx="11620500" cy="369332"/>
+          </a:xfrm>
+          <a:prstGeom prst="rect">
+            <a:avLst/>
+          </a:prstGeom>
+          <a:noFill/>
+        </p:spPr>
+        <p:txBody>
+          <a:bodyPr wrap="square" rtlCol="0">
+            <a:spAutoFit/>
+          </a:bodyPr>
+          <a:lstStyle/>
+          <a:p>
+            <a:r>
+              <a:rPr lang="pt-BR" dirty="0"/>
+              <a:t>Desenhe o consenso do seu grupo a respeito de como deve ser a primeira página do portfólio e a página “Sobre Mim”.</a:t>
+            </a:r>
+            <a:endParaRPr lang="pt-BR" sz="1600" dirty="0"/>
           </a:p>
         </p:txBody>
       </p:sp>
@@ -11680,7 +11723,7 @@
         </p:nvSpPr>
         <p:spPr>
           <a:xfrm>
-            <a:off x="508000" y="939800"/>
+            <a:off x="469900" y="1252032"/>
             <a:ext cx="11252200" cy="5384800"/>
           </a:xfrm>
           <a:prstGeom prst="roundRect">
@@ -11710,7 +11753,7 @@
             <a:pPr algn="ctr"/>
             <a:r>
               <a:rPr lang="pt-BR" sz="3600" dirty="0"/>
-              <a:t>Desenhe um exemplo AQUI!</a:t>
+              <a:t>Desenhe sua página inicial do portfólio AQUI!</a:t>
             </a:r>
           </a:p>
         </p:txBody>
@@ -11718,7 +11761,7 @@
     </p:spTree>
     <p:extLst>
       <p:ext uri="{BB962C8B-B14F-4D97-AF65-F5344CB8AC3E}">
-        <p14:creationId xmlns:p14="http://schemas.microsoft.com/office/powerpoint/2010/main" val="3438142704"/>
+        <p14:creationId xmlns:p14="http://schemas.microsoft.com/office/powerpoint/2010/main" val="2326673454"/>
       </p:ext>
     </p:extLst>
   </p:cSld>
@@ -11757,7 +11800,7 @@
         </p:nvSpPr>
         <p:spPr>
           <a:xfrm>
-            <a:off x="266700" y="-104775"/>
+            <a:off x="240575" y="0"/>
             <a:ext cx="10515600" cy="1325563"/>
           </a:xfrm>
         </p:spPr>
@@ -11774,190 +11817,35 @@
           </a:p>
         </p:txBody>
       </p:sp>
-      <p:sp>
-        <p:nvSpPr>
+      <p:pic>
+        <p:nvPicPr>
           <p:cNvPr id="3" name="Espaço Reservado para Conteúdo 2"/>
-          <p:cNvSpPr>
-            <a:spLocks noGrp="1"/>
-          </p:cNvSpPr>
+          <p:cNvPicPr>
+            <a:picLocks noGrp="1" noChangeAspect="1"/>
+          </p:cNvPicPr>
           <p:nvPr>
             <p:ph idx="1"/>
           </p:nvPr>
-        </p:nvSpPr>
+        </p:nvPicPr>
+        <p:blipFill>
+          <a:blip r:embed="rId2">
+            <a:extLst>
+              <a:ext uri="{28A0092B-C50C-407E-A947-70E740481C1C}">
+                <a14:useLocalDpi xmlns:a14="http://schemas.microsoft.com/office/drawing/2010/main" val="0"/>
+              </a:ext>
+            </a:extLst>
+          </a:blip>
+          <a:stretch>
+            <a:fillRect/>
+          </a:stretch>
+        </p:blipFill>
         <p:spPr>
           <a:xfrm>
-            <a:off x="2184400" y="357312"/>
-            <a:ext cx="9855200" cy="4351338"/>
+            <a:off x="2228144" y="1825625"/>
+            <a:ext cx="7735712" cy="4351338"/>
           </a:xfrm>
         </p:spPr>
-        <p:txBody>
-          <a:bodyPr>
-            <a:normAutofit/>
-          </a:bodyPr>
-          <a:lstStyle/>
-          <a:p>
-            <a:pPr marL="0" indent="0">
-              <a:buNone/>
-            </a:pPr>
-            <a:r>
-              <a:rPr lang="pt-BR" sz="1800" dirty="0"/>
-              <a:t>Para ser completo, o portfólio deve ter uma página inicial e uma página sobre o aluno.</a:t>
-            </a:r>
-            <a:endParaRPr lang="pt-BR" sz="1200" dirty="0"/>
-          </a:p>
-        </p:txBody>
-      </p:sp>
-      <p:sp>
-        <p:nvSpPr>
-          <p:cNvPr id="6" name="CaixaDeTexto 5"/>
-          <p:cNvSpPr txBox="1"/>
-          <p:nvPr/>
-        </p:nvSpPr>
-        <p:spPr>
-          <a:xfrm>
-            <a:off x="279400" y="908111"/>
-            <a:ext cx="11620500" cy="369332"/>
-          </a:xfrm>
-          <a:prstGeom prst="rect">
-            <a:avLst/>
-          </a:prstGeom>
-          <a:noFill/>
-        </p:spPr>
-        <p:txBody>
-          <a:bodyPr wrap="square" rtlCol="0">
-            <a:spAutoFit/>
-          </a:bodyPr>
-          <a:lstStyle/>
-          <a:p>
-            <a:r>
-              <a:rPr lang="pt-BR" dirty="0"/>
-              <a:t>Desenhe o consenso do seu grupo a respeito de como deve ser a primeira página do portfólio e a página “Sobre Mim”.</a:t>
-            </a:r>
-            <a:endParaRPr lang="pt-BR" sz="1600" dirty="0"/>
-          </a:p>
-        </p:txBody>
-      </p:sp>
-      <p:sp>
-        <p:nvSpPr>
-          <p:cNvPr id="5" name="Retângulo: Cantos Arredondados 4"/>
-          <p:cNvSpPr/>
-          <p:nvPr/>
-        </p:nvSpPr>
-        <p:spPr>
-          <a:xfrm>
-            <a:off x="469900" y="1252032"/>
-            <a:ext cx="11252200" cy="5384800"/>
-          </a:xfrm>
-          <a:prstGeom prst="roundRect">
-            <a:avLst/>
-          </a:prstGeom>
-        </p:spPr>
-        <p:style>
-          <a:lnRef idx="2">
-            <a:schemeClr val="accent1">
-              <a:shade val="50000"/>
-            </a:schemeClr>
-          </a:lnRef>
-          <a:fillRef idx="1">
-            <a:schemeClr val="accent1"/>
-          </a:fillRef>
-          <a:effectRef idx="0">
-            <a:schemeClr val="accent1"/>
-          </a:effectRef>
-          <a:fontRef idx="minor">
-            <a:schemeClr val="lt1"/>
-          </a:fontRef>
-        </p:style>
-        <p:txBody>
-          <a:bodyPr rtlCol="0" anchor="ctr"/>
-          <a:lstStyle/>
-          <a:p>
-            <a:pPr algn="ctr"/>
-            <a:r>
-              <a:rPr lang="pt-BR" sz="3600" dirty="0"/>
-              <a:t>Desenhe sua página inicial do portfólio AQUI!</a:t>
-            </a:r>
-          </a:p>
-        </p:txBody>
-      </p:sp>
-    </p:spTree>
-    <p:extLst>
-      <p:ext uri="{BB962C8B-B14F-4D97-AF65-F5344CB8AC3E}">
-        <p14:creationId xmlns:p14="http://schemas.microsoft.com/office/powerpoint/2010/main" val="2326673454"/>
-      </p:ext>
-    </p:extLst>
-  </p:cSld>
-  <p:clrMapOvr>
-    <a:masterClrMapping/>
-  </p:clrMapOvr>
-</p:sld>
-</file>
-
-<file path=ppt/slides/slide12.xml><?xml version="1.0" encoding="utf-8"?>
-<p:sld xmlns:a="http://schemas.openxmlformats.org/drawingml/2006/main" xmlns:r="http://schemas.openxmlformats.org/officeDocument/2006/relationships" xmlns:p="http://schemas.openxmlformats.org/presentationml/2006/main">
-  <p:cSld>
-    <p:spTree>
-      <p:nvGrpSpPr>
-        <p:cNvPr id="1" name=""/>
-        <p:cNvGrpSpPr/>
-        <p:nvPr/>
-      </p:nvGrpSpPr>
-      <p:grpSpPr>
-        <a:xfrm>
-          <a:off x="0" y="0"/>
-          <a:ext cx="0" cy="0"/>
-          <a:chOff x="0" y="0"/>
-          <a:chExt cx="0" cy="0"/>
-        </a:xfrm>
-      </p:grpSpPr>
-      <p:sp>
-        <p:nvSpPr>
-          <p:cNvPr id="2" name="Título 1"/>
-          <p:cNvSpPr>
-            <a:spLocks noGrp="1"/>
-          </p:cNvSpPr>
-          <p:nvPr>
-            <p:ph type="title"/>
-          </p:nvPr>
-        </p:nvSpPr>
-        <p:spPr>
-          <a:xfrm>
-            <a:off x="266700" y="-104775"/>
-            <a:ext cx="10515600" cy="1325563"/>
-          </a:xfrm>
-        </p:spPr>
-        <p:txBody>
-          <a:bodyPr>
-            <a:normAutofit/>
-          </a:bodyPr>
-          <a:lstStyle/>
-          <a:p>
-            <a:r>
-              <a:rPr lang="pt-BR" sz="2800" dirty="0"/>
-              <a:t>4ª atividade</a:t>
-            </a:r>
-          </a:p>
-        </p:txBody>
-      </p:sp>
-      <p:sp>
-        <p:nvSpPr>
-          <p:cNvPr id="4" name="Espaço Reservado para Conteúdo 3"/>
-          <p:cNvSpPr>
-            <a:spLocks noGrp="1"/>
-          </p:cNvSpPr>
-          <p:nvPr>
-            <p:ph idx="1"/>
-          </p:nvPr>
-        </p:nvSpPr>
-        <p:spPr/>
-        <p:txBody>
-          <a:bodyPr/>
-          <a:lstStyle/>
-          <a:p>
-            <a:endParaRPr lang="pt-BR"/>
-          </a:p>
-        </p:txBody>
-      </p:sp>
+      </p:pic>
       <p:sp>
         <p:nvSpPr>
           <p:cNvPr id="5" name="Retângulo: Cantos Arredondados 4"/>
@@ -11998,6 +11886,140 @@
               <a:rPr lang="pt-BR" sz="3600" dirty="0"/>
               <a:t>Desenhe sua página “Sobre mim” AQUI!</a:t>
             </a:r>
+          </a:p>
+        </p:txBody>
+      </p:sp>
+      <p:pic>
+        <p:nvPicPr>
+          <p:cNvPr id="6" name="Imagem 5"/>
+          <p:cNvPicPr>
+            <a:picLocks noChangeAspect="1"/>
+          </p:cNvPicPr>
+          <p:nvPr/>
+        </p:nvPicPr>
+        <p:blipFill>
+          <a:blip r:embed="rId2">
+            <a:extLst>
+              <a:ext uri="{28A0092B-C50C-407E-A947-70E740481C1C}">
+                <a14:useLocalDpi xmlns:a14="http://schemas.microsoft.com/office/drawing/2010/main" val="0"/>
+              </a:ext>
+            </a:extLst>
+          </a:blip>
+          <a:stretch>
+            <a:fillRect/>
+          </a:stretch>
+        </p:blipFill>
+        <p:spPr>
+          <a:xfrm>
+            <a:off x="469900" y="796937"/>
+            <a:ext cx="11252200" cy="6056289"/>
+          </a:xfrm>
+          <a:prstGeom prst="rect">
+            <a:avLst/>
+          </a:prstGeom>
+        </p:spPr>
+      </p:pic>
+      <p:sp>
+        <p:nvSpPr>
+          <p:cNvPr id="7" name="CaixaDeTexto 6"/>
+          <p:cNvSpPr txBox="1"/>
+          <p:nvPr/>
+        </p:nvSpPr>
+        <p:spPr>
+          <a:xfrm>
+            <a:off x="4369525" y="3334414"/>
+            <a:ext cx="4509589" cy="1815882"/>
+          </a:xfrm>
+          <a:prstGeom prst="rect">
+            <a:avLst/>
+          </a:prstGeom>
+          <a:noFill/>
+        </p:spPr>
+        <p:txBody>
+          <a:bodyPr wrap="square" rtlCol="0">
+            <a:spAutoFit/>
+          </a:bodyPr>
+          <a:lstStyle/>
+          <a:p>
+            <a:r>
+              <a:rPr lang="pt-BR" sz="2800" dirty="0" smtClean="0"/>
+              <a:t>Uma breve </a:t>
+            </a:r>
+            <a:r>
+              <a:rPr lang="pt-BR" sz="2800" dirty="0" err="1" smtClean="0"/>
+              <a:t>bio</a:t>
+            </a:r>
+            <a:r>
+              <a:rPr lang="pt-BR" sz="2800" dirty="0" smtClean="0"/>
+              <a:t> explicando sobre interesses, experiências acadêmicas e profissionais, e curiosidades </a:t>
+            </a:r>
+            <a:endParaRPr lang="pt-BR" sz="2800" dirty="0"/>
+          </a:p>
+        </p:txBody>
+      </p:sp>
+      <p:sp>
+        <p:nvSpPr>
+          <p:cNvPr id="8" name="CaixaDeTexto 7"/>
+          <p:cNvSpPr txBox="1"/>
+          <p:nvPr/>
+        </p:nvSpPr>
+        <p:spPr>
+          <a:xfrm>
+            <a:off x="968304" y="2534195"/>
+            <a:ext cx="2316480" cy="3416320"/>
+          </a:xfrm>
+          <a:prstGeom prst="rect">
+            <a:avLst/>
+          </a:prstGeom>
+          <a:solidFill>
+            <a:schemeClr val="accent4">
+              <a:lumMod val="75000"/>
+            </a:schemeClr>
+          </a:solidFill>
+        </p:spPr>
+        <p:txBody>
+          <a:bodyPr wrap="square" rtlCol="0">
+            <a:spAutoFit/>
+          </a:bodyPr>
+          <a:lstStyle/>
+          <a:p>
+            <a:r>
+              <a:rPr lang="pt-BR" dirty="0" smtClean="0"/>
+              <a:t>Foto</a:t>
+            </a:r>
+          </a:p>
+          <a:p>
+            <a:endParaRPr lang="pt-BR" dirty="0"/>
+          </a:p>
+          <a:p>
+            <a:endParaRPr lang="pt-BR" dirty="0" smtClean="0"/>
+          </a:p>
+          <a:p>
+            <a:endParaRPr lang="pt-BR" dirty="0"/>
+          </a:p>
+          <a:p>
+            <a:endParaRPr lang="pt-BR" dirty="0" smtClean="0"/>
+          </a:p>
+          <a:p>
+            <a:endParaRPr lang="pt-BR" dirty="0"/>
+          </a:p>
+          <a:p>
+            <a:endParaRPr lang="pt-BR" dirty="0" smtClean="0"/>
+          </a:p>
+          <a:p>
+            <a:endParaRPr lang="pt-BR" dirty="0"/>
+          </a:p>
+          <a:p>
+            <a:endParaRPr lang="pt-BR" dirty="0" smtClean="0"/>
+          </a:p>
+          <a:p>
+            <a:endParaRPr lang="pt-BR" dirty="0"/>
+          </a:p>
+          <a:p>
+            <a:endParaRPr lang="pt-BR" dirty="0" smtClean="0"/>
+          </a:p>
+          <a:p>
+            <a:endParaRPr lang="pt-BR" dirty="0"/>
           </a:p>
         </p:txBody>
       </p:sp>
@@ -12663,7 +12685,15 @@
             <a:pPr algn="ctr"/>
             <a:r>
               <a:rPr lang="pt-BR" sz="3600" dirty="0" smtClean="0"/>
-              <a:t>Colocaremos um menu vertical do lado esquerdo da página, e no centro haverá uma </a:t>
+              <a:t>Colocaremos um menu vertical do lado </a:t>
+            </a:r>
+            <a:r>
+              <a:rPr lang="pt-BR" sz="3600" dirty="0" smtClean="0"/>
+              <a:t>direito </a:t>
+            </a:r>
+            <a:r>
+              <a:rPr lang="pt-BR" sz="3600" dirty="0" smtClean="0"/>
+              <a:t>da página, e no centro haverá uma </a:t>
             </a:r>
             <a:r>
               <a:rPr lang="pt-BR" sz="3600" dirty="0" err="1" smtClean="0"/>
@@ -12671,7 +12701,19 @@
             </a:r>
             <a:r>
               <a:rPr lang="pt-BR" sz="3600" dirty="0" smtClean="0"/>
-              <a:t> com os projetos mais requisitados. Esse critério será feito de acordo com o interesse de cada um dos usuários, assim como os tópicos da barra lateral do menu.</a:t>
+              <a:t> com os projetos mais requisitados. Esse critério será feito de acordo com o interesse de cada um dos usuários, assim como os tópicos da barra lateral do menu</a:t>
+            </a:r>
+            <a:r>
+              <a:rPr lang="pt-BR" sz="3600" dirty="0" smtClean="0"/>
+              <a:t>. No caso do profissional do mercado financeiro, gostaríamos de destacar </a:t>
+            </a:r>
+            <a:r>
+              <a:rPr lang="pt-BR" sz="3600" dirty="0" err="1" smtClean="0"/>
+              <a:t>ModSim</a:t>
+            </a:r>
+            <a:r>
+              <a:rPr lang="pt-BR" sz="3600" dirty="0" smtClean="0"/>
+              <a:t>, Natureza do Design e Grandes Desafios da Engenharia </a:t>
             </a:r>
             <a:endParaRPr lang="pt-BR" sz="3600" dirty="0"/>
           </a:p>
@@ -13363,6 +13405,146 @@
               <a:rPr lang="pt-BR" sz="3600" dirty="0"/>
               <a:t>Desenhe sua página de projeto AQUI!</a:t>
             </a:r>
+          </a:p>
+        </p:txBody>
+      </p:sp>
+      <p:pic>
+        <p:nvPicPr>
+          <p:cNvPr id="6" name="Imagem 5"/>
+          <p:cNvPicPr>
+            <a:picLocks noChangeAspect="1"/>
+          </p:cNvPicPr>
+          <p:nvPr/>
+        </p:nvPicPr>
+        <p:blipFill>
+          <a:blip r:embed="rId2">
+            <a:extLst>
+              <a:ext uri="{28A0092B-C50C-407E-A947-70E740481C1C}">
+                <a14:useLocalDpi xmlns:a14="http://schemas.microsoft.com/office/drawing/2010/main" val="0"/>
+              </a:ext>
+            </a:extLst>
+          </a:blip>
+          <a:stretch>
+            <a:fillRect/>
+          </a:stretch>
+        </p:blipFill>
+        <p:spPr>
+          <a:xfrm>
+            <a:off x="478609" y="724989"/>
+            <a:ext cx="11252200" cy="6133011"/>
+          </a:xfrm>
+          <a:prstGeom prst="rect">
+            <a:avLst/>
+          </a:prstGeom>
+        </p:spPr>
+      </p:pic>
+      <p:sp>
+        <p:nvSpPr>
+          <p:cNvPr id="7" name="CaixaDeTexto 6"/>
+          <p:cNvSpPr txBox="1"/>
+          <p:nvPr/>
+        </p:nvSpPr>
+        <p:spPr>
+          <a:xfrm>
+            <a:off x="8940437" y="2246810"/>
+            <a:ext cx="2229394" cy="3785652"/>
+          </a:xfrm>
+          <a:prstGeom prst="rect">
+            <a:avLst/>
+          </a:prstGeom>
+          <a:noFill/>
+        </p:spPr>
+        <p:txBody>
+          <a:bodyPr wrap="square" rtlCol="0">
+            <a:spAutoFit/>
+          </a:bodyPr>
+          <a:lstStyle/>
+          <a:p>
+            <a:r>
+              <a:rPr lang="pt-BR" sz="2400" dirty="0" smtClean="0"/>
+              <a:t>Nessa região haverá a </a:t>
+            </a:r>
+            <a:r>
+              <a:rPr lang="pt-BR" sz="2400" dirty="0" err="1" smtClean="0"/>
+              <a:t>menubar</a:t>
+            </a:r>
+            <a:r>
+              <a:rPr lang="pt-BR" sz="2400" dirty="0" smtClean="0"/>
+              <a:t> com os projetos em ordem de importância: </a:t>
+            </a:r>
+            <a:r>
+              <a:rPr lang="pt-BR" sz="2400" dirty="0" err="1" smtClean="0"/>
+              <a:t>Modsim</a:t>
+            </a:r>
+            <a:r>
+              <a:rPr lang="pt-BR" sz="2400" dirty="0" smtClean="0"/>
+              <a:t>, </a:t>
+            </a:r>
+            <a:r>
+              <a:rPr lang="pt-BR" sz="2400" dirty="0" err="1" smtClean="0"/>
+              <a:t>NatDes</a:t>
+            </a:r>
+            <a:r>
+              <a:rPr lang="pt-BR" sz="2400" dirty="0" smtClean="0"/>
+              <a:t>, GDE, </a:t>
+            </a:r>
+            <a:r>
+              <a:rPr lang="pt-BR" sz="2400" dirty="0" err="1" smtClean="0"/>
+              <a:t>DesSoft</a:t>
+            </a:r>
+            <a:r>
+              <a:rPr lang="pt-BR" sz="2400" dirty="0" smtClean="0"/>
+              <a:t>, </a:t>
+            </a:r>
+            <a:r>
+              <a:rPr lang="pt-BR" sz="2400" dirty="0" err="1" smtClean="0"/>
+              <a:t>InstruMed</a:t>
+            </a:r>
+            <a:endParaRPr lang="pt-BR" sz="2400" dirty="0"/>
+          </a:p>
+        </p:txBody>
+      </p:sp>
+      <p:sp>
+        <p:nvSpPr>
+          <p:cNvPr id="8" name="CaixaDeTexto 7"/>
+          <p:cNvSpPr txBox="1"/>
+          <p:nvPr/>
+        </p:nvSpPr>
+        <p:spPr>
+          <a:xfrm>
+            <a:off x="757644" y="2050552"/>
+            <a:ext cx="6287588" cy="369332"/>
+          </a:xfrm>
+          <a:prstGeom prst="rect">
+            <a:avLst/>
+          </a:prstGeom>
+          <a:solidFill>
+            <a:schemeClr val="accent2"/>
+          </a:solidFill>
+        </p:spPr>
+        <p:txBody>
+          <a:bodyPr wrap="square" rtlCol="0">
+            <a:spAutoFit/>
+          </a:bodyPr>
+          <a:lstStyle/>
+          <a:p>
+            <a:r>
+              <a:rPr lang="pt-BR" dirty="0" err="1" smtClean="0"/>
+              <a:t>ModSim</a:t>
+            </a:r>
+            <a:r>
+              <a:rPr lang="pt-BR" dirty="0" smtClean="0"/>
+              <a:t>                              </a:t>
+            </a:r>
+            <a:r>
+              <a:rPr lang="pt-BR" dirty="0" err="1" smtClean="0"/>
+              <a:t>NatDes</a:t>
+            </a:r>
+            <a:r>
+              <a:rPr lang="pt-BR" dirty="0" smtClean="0"/>
+              <a:t>                                       GDE</a:t>
+            </a:r>
+            <a:endParaRPr lang="pt-BR" dirty="0"/>
           </a:p>
         </p:txBody>
       </p:sp>

</xml_diff>